<commit_message>
Update Final Project Presentation.pptx
</commit_message>
<xml_diff>
--- a/PPT_Files/Final Project Presentation.pptx
+++ b/PPT_Files/Final Project Presentation.pptx
@@ -7967,13 +7967,8 @@
             <a:pPr lvl="1"/>
             <a:r>
               <a:rPr lang="en-US" dirty="0"/>
-              <a:t>Date Range: February 2020 </a:t>
-            </a:r>
-            <a:r>
-              <a:rPr lang="en-US"/>
-              <a:t>– November 2021</a:t>
-            </a:r>
-            <a:endParaRPr lang="en-US" dirty="0"/>
+              <a:t>Date Range: February 2020 – November 2021</a:t>
+            </a:r>
           </a:p>
           <a:p>
             <a:pPr lvl="1"/>

</xml_diff>